<commit_message>
updated ppt slides and pics
</commit_message>
<xml_diff>
--- a/doc/diagrams/CommonComponent.pptx
+++ b/doc/diagrams/CommonComponent.pptx
@@ -107,6 +107,22 @@
       </a:defRPr>
     </a:lvl9pPr>
   </p:defaultTextStyle>
+  <p:extLst>
+    <p:ext uri="{EFAFB233-063F-42B5-8137-9DF3F51BA10A}">
+      <p15:sldGuideLst xmlns:p15="http://schemas.microsoft.com/office/powerpoint/2012/main">
+        <p15:guide id="1" orient="horz" pos="1613">
+          <p15:clr>
+            <a:srgbClr val="A4A3A4"/>
+          </p15:clr>
+        </p15:guide>
+        <p15:guide id="2" pos="2880">
+          <p15:clr>
+            <a:srgbClr val="A4A3A4"/>
+          </p15:clr>
+        </p15:guide>
+      </p15:sldGuideLst>
+    </p:ext>
+  </p:extLst>
 </p:presentation>
 </file>
 
@@ -306,7 +322,7 @@
             <a:fld id="{1D8BD707-D9CF-40AE-B4C6-C98DA3205C09}" type="datetimeFigureOut">
               <a:rPr lang="en-US" smtClean="0"/>
               <a:pPr/>
-              <a:t>7/6/2013</a:t>
+              <a:t>3/19/2016</a:t>
             </a:fld>
             <a:endParaRPr lang="en-US"/>
           </a:p>
@@ -513,7 +529,7 @@
             <a:fld id="{1D8BD707-D9CF-40AE-B4C6-C98DA3205C09}" type="datetimeFigureOut">
               <a:rPr lang="en-US" smtClean="0"/>
               <a:pPr/>
-              <a:t>7/6/2013</a:t>
+              <a:t>3/19/2016</a:t>
             </a:fld>
             <a:endParaRPr lang="en-US"/>
           </a:p>
@@ -720,7 +736,7 @@
             <a:fld id="{1D8BD707-D9CF-40AE-B4C6-C98DA3205C09}" type="datetimeFigureOut">
               <a:rPr lang="en-US" smtClean="0"/>
               <a:pPr/>
-              <a:t>7/6/2013</a:t>
+              <a:t>3/19/2016</a:t>
             </a:fld>
             <a:endParaRPr lang="en-US"/>
           </a:p>
@@ -927,7 +943,7 @@
             <a:fld id="{1D8BD707-D9CF-40AE-B4C6-C98DA3205C09}" type="datetimeFigureOut">
               <a:rPr lang="en-US" smtClean="0"/>
               <a:pPr/>
-              <a:t>7/6/2013</a:t>
+              <a:t>3/19/2016</a:t>
             </a:fld>
             <a:endParaRPr lang="en-US"/>
           </a:p>
@@ -1200,7 +1216,7 @@
             <a:fld id="{1D8BD707-D9CF-40AE-B4C6-C98DA3205C09}" type="datetimeFigureOut">
               <a:rPr lang="en-US" smtClean="0"/>
               <a:pPr/>
-              <a:t>7/6/2013</a:t>
+              <a:t>3/19/2016</a:t>
             </a:fld>
             <a:endParaRPr lang="en-US"/>
           </a:p>
@@ -1523,7 +1539,7 @@
             <a:fld id="{1D8BD707-D9CF-40AE-B4C6-C98DA3205C09}" type="datetimeFigureOut">
               <a:rPr lang="en-US" smtClean="0"/>
               <a:pPr/>
-              <a:t>7/6/2013</a:t>
+              <a:t>3/19/2016</a:t>
             </a:fld>
             <a:endParaRPr lang="en-US"/>
           </a:p>
@@ -1986,7 +2002,7 @@
             <a:fld id="{1D8BD707-D9CF-40AE-B4C6-C98DA3205C09}" type="datetimeFigureOut">
               <a:rPr lang="en-US" smtClean="0"/>
               <a:pPr/>
-              <a:t>7/6/2013</a:t>
+              <a:t>3/19/2016</a:t>
             </a:fld>
             <a:endParaRPr lang="en-US"/>
           </a:p>
@@ -2133,7 +2149,7 @@
             <a:fld id="{1D8BD707-D9CF-40AE-B4C6-C98DA3205C09}" type="datetimeFigureOut">
               <a:rPr lang="en-US" smtClean="0"/>
               <a:pPr/>
-              <a:t>7/6/2013</a:t>
+              <a:t>3/19/2016</a:t>
             </a:fld>
             <a:endParaRPr lang="en-US"/>
           </a:p>
@@ -2249,7 +2265,7 @@
             <a:fld id="{1D8BD707-D9CF-40AE-B4C6-C98DA3205C09}" type="datetimeFigureOut">
               <a:rPr lang="en-US" smtClean="0"/>
               <a:pPr/>
-              <a:t>7/6/2013</a:t>
+              <a:t>3/19/2016</a:t>
             </a:fld>
             <a:endParaRPr lang="en-US"/>
           </a:p>
@@ -2556,7 +2572,7 @@
             <a:fld id="{1D8BD707-D9CF-40AE-B4C6-C98DA3205C09}" type="datetimeFigureOut">
               <a:rPr lang="en-US" smtClean="0"/>
               <a:pPr/>
-              <a:t>7/6/2013</a:t>
+              <a:t>3/19/2016</a:t>
             </a:fld>
             <a:endParaRPr lang="en-US"/>
           </a:p>
@@ -2839,7 +2855,7 @@
             <a:fld id="{1D8BD707-D9CF-40AE-B4C6-C98DA3205C09}" type="datetimeFigureOut">
               <a:rPr lang="en-US" smtClean="0"/>
               <a:pPr/>
-              <a:t>7/6/2013</a:t>
+              <a:t>3/19/2016</a:t>
             </a:fld>
             <a:endParaRPr lang="en-US"/>
           </a:p>
@@ -4373,7 +4389,7 @@
           <a:p>
             <a:r>
               <a:rPr lang="en-US" sz="1600" b="1" dirty="0" err="1" smtClean="0"/>
-              <a:t>EvaluationAttributes</a:t>
+              <a:t>CommentAttributes</a:t>
             </a:r>
             <a:endParaRPr lang="en-SG" sz="1600" b="1" dirty="0"/>
           </a:p>
@@ -4416,11 +4432,7 @@
           <a:p>
             <a:r>
               <a:rPr lang="en-US" sz="1600" b="1" dirty="0" smtClean="0"/>
-              <a:t>……………</a:t>
-            </a:r>
-            <a:r>
-              <a:rPr lang="en-US" sz="1600" b="1" dirty="0" smtClean="0"/>
-              <a:t>…Attributes</a:t>
+              <a:t>*Attributes</a:t>
             </a:r>
             <a:endParaRPr lang="en-SG" sz="1600" b="1" dirty="0"/>
           </a:p>
@@ -5076,8 +5088,8 @@
               <a:t>*</a:t>
             </a:r>
             <a:r>
-              <a:rPr lang="en-US" sz="1600" b="1" dirty="0" err="1" smtClean="0"/>
-              <a:t>Summry</a:t>
+              <a:rPr lang="en-US" sz="1600" b="1" dirty="0" smtClean="0"/>
+              <a:t>Summary</a:t>
             </a:r>
             <a:endParaRPr lang="en-SG" sz="1600" b="1" dirty="0"/>
           </a:p>

</xml_diff>

<commit_message>
[3395] Update devman and design diagram
</commit_message>
<xml_diff>
--- a/doc/diagrams/CommonComponent.pptx
+++ b/doc/diagrams/CommonComponent.pptx
@@ -107,6 +107,22 @@
       </a:defRPr>
     </a:lvl9pPr>
   </p:defaultTextStyle>
+  <p:extLst>
+    <p:ext uri="{EFAFB233-063F-42B5-8137-9DF3F51BA10A}">
+      <p15:sldGuideLst xmlns:p15="http://schemas.microsoft.com/office/powerpoint/2012/main">
+        <p15:guide id="1" orient="horz" pos="1613">
+          <p15:clr>
+            <a:srgbClr val="A4A3A4"/>
+          </p15:clr>
+        </p15:guide>
+        <p15:guide id="2" pos="2880">
+          <p15:clr>
+            <a:srgbClr val="A4A3A4"/>
+          </p15:clr>
+        </p15:guide>
+      </p15:sldGuideLst>
+    </p:ext>
+  </p:extLst>
 </p:presentation>
 </file>
 
@@ -306,7 +322,7 @@
             <a:fld id="{1D8BD707-D9CF-40AE-B4C6-C98DA3205C09}" type="datetimeFigureOut">
               <a:rPr lang="en-US" smtClean="0"/>
               <a:pPr/>
-              <a:t>7/6/2013</a:t>
+              <a:t>3/19/2016</a:t>
             </a:fld>
             <a:endParaRPr lang="en-US"/>
           </a:p>
@@ -513,7 +529,7 @@
             <a:fld id="{1D8BD707-D9CF-40AE-B4C6-C98DA3205C09}" type="datetimeFigureOut">
               <a:rPr lang="en-US" smtClean="0"/>
               <a:pPr/>
-              <a:t>7/6/2013</a:t>
+              <a:t>3/19/2016</a:t>
             </a:fld>
             <a:endParaRPr lang="en-US"/>
           </a:p>
@@ -720,7 +736,7 @@
             <a:fld id="{1D8BD707-D9CF-40AE-B4C6-C98DA3205C09}" type="datetimeFigureOut">
               <a:rPr lang="en-US" smtClean="0"/>
               <a:pPr/>
-              <a:t>7/6/2013</a:t>
+              <a:t>3/19/2016</a:t>
             </a:fld>
             <a:endParaRPr lang="en-US"/>
           </a:p>
@@ -927,7 +943,7 @@
             <a:fld id="{1D8BD707-D9CF-40AE-B4C6-C98DA3205C09}" type="datetimeFigureOut">
               <a:rPr lang="en-US" smtClean="0"/>
               <a:pPr/>
-              <a:t>7/6/2013</a:t>
+              <a:t>3/19/2016</a:t>
             </a:fld>
             <a:endParaRPr lang="en-US"/>
           </a:p>
@@ -1200,7 +1216,7 @@
             <a:fld id="{1D8BD707-D9CF-40AE-B4C6-C98DA3205C09}" type="datetimeFigureOut">
               <a:rPr lang="en-US" smtClean="0"/>
               <a:pPr/>
-              <a:t>7/6/2013</a:t>
+              <a:t>3/19/2016</a:t>
             </a:fld>
             <a:endParaRPr lang="en-US"/>
           </a:p>
@@ -1523,7 +1539,7 @@
             <a:fld id="{1D8BD707-D9CF-40AE-B4C6-C98DA3205C09}" type="datetimeFigureOut">
               <a:rPr lang="en-US" smtClean="0"/>
               <a:pPr/>
-              <a:t>7/6/2013</a:t>
+              <a:t>3/19/2016</a:t>
             </a:fld>
             <a:endParaRPr lang="en-US"/>
           </a:p>
@@ -1986,7 +2002,7 @@
             <a:fld id="{1D8BD707-D9CF-40AE-B4C6-C98DA3205C09}" type="datetimeFigureOut">
               <a:rPr lang="en-US" smtClean="0"/>
               <a:pPr/>
-              <a:t>7/6/2013</a:t>
+              <a:t>3/19/2016</a:t>
             </a:fld>
             <a:endParaRPr lang="en-US"/>
           </a:p>
@@ -2133,7 +2149,7 @@
             <a:fld id="{1D8BD707-D9CF-40AE-B4C6-C98DA3205C09}" type="datetimeFigureOut">
               <a:rPr lang="en-US" smtClean="0"/>
               <a:pPr/>
-              <a:t>7/6/2013</a:t>
+              <a:t>3/19/2016</a:t>
             </a:fld>
             <a:endParaRPr lang="en-US"/>
           </a:p>
@@ -2249,7 +2265,7 @@
             <a:fld id="{1D8BD707-D9CF-40AE-B4C6-C98DA3205C09}" type="datetimeFigureOut">
               <a:rPr lang="en-US" smtClean="0"/>
               <a:pPr/>
-              <a:t>7/6/2013</a:t>
+              <a:t>3/19/2016</a:t>
             </a:fld>
             <a:endParaRPr lang="en-US"/>
           </a:p>
@@ -2556,7 +2572,7 @@
             <a:fld id="{1D8BD707-D9CF-40AE-B4C6-C98DA3205C09}" type="datetimeFigureOut">
               <a:rPr lang="en-US" smtClean="0"/>
               <a:pPr/>
-              <a:t>7/6/2013</a:t>
+              <a:t>3/19/2016</a:t>
             </a:fld>
             <a:endParaRPr lang="en-US"/>
           </a:p>
@@ -2839,7 +2855,7 @@
             <a:fld id="{1D8BD707-D9CF-40AE-B4C6-C98DA3205C09}" type="datetimeFigureOut">
               <a:rPr lang="en-US" smtClean="0"/>
               <a:pPr/>
-              <a:t>7/6/2013</a:t>
+              <a:t>3/19/2016</a:t>
             </a:fld>
             <a:endParaRPr lang="en-US"/>
           </a:p>
@@ -4373,7 +4389,7 @@
           <a:p>
             <a:r>
               <a:rPr lang="en-US" sz="1600" b="1" dirty="0" err="1" smtClean="0"/>
-              <a:t>EvaluationAttributes</a:t>
+              <a:t>CommentAttributes</a:t>
             </a:r>
             <a:endParaRPr lang="en-SG" sz="1600" b="1" dirty="0"/>
           </a:p>
@@ -4416,11 +4432,7 @@
           <a:p>
             <a:r>
               <a:rPr lang="en-US" sz="1600" b="1" dirty="0" smtClean="0"/>
-              <a:t>……………</a:t>
-            </a:r>
-            <a:r>
-              <a:rPr lang="en-US" sz="1600" b="1" dirty="0" smtClean="0"/>
-              <a:t>…Attributes</a:t>
+              <a:t>*Attributes</a:t>
             </a:r>
             <a:endParaRPr lang="en-SG" sz="1600" b="1" dirty="0"/>
           </a:p>
@@ -5076,8 +5088,8 @@
               <a:t>*</a:t>
             </a:r>
             <a:r>
-              <a:rPr lang="en-US" sz="1600" b="1" dirty="0" err="1" smtClean="0"/>
-              <a:t>Summry</a:t>
+              <a:rPr lang="en-US" sz="1600" b="1" dirty="0" smtClean="0"/>
+              <a:t>Summary</a:t>
             </a:r>
             <a:endParaRPr lang="en-SG" sz="1600" b="1" dirty="0"/>
           </a:p>

</xml_diff>